<commit_message>
Updated PushEventButton to allow for capturing both push and release.
Updated PushEventButton to allow for capturing both push and release.
</commit_message>
<xml_diff>
--- a/documentation/Documentation.pptx
+++ b/documentation/Documentation.pptx
@@ -275,7 +275,7 @@
           <a:p>
             <a:fld id="{5BBE8B7C-962A-488F-9EDA-3E88B9A0CE54}" type="datetimeFigureOut">
               <a:rPr lang="en-US" smtClean="0"/>
-              <a:t>6/25/2021</a:t>
+              <a:t>6/28/2021</a:t>
             </a:fld>
             <a:endParaRPr lang="en-US"/>
           </a:p>
@@ -445,7 +445,7 @@
           <a:p>
             <a:fld id="{5BBE8B7C-962A-488F-9EDA-3E88B9A0CE54}" type="datetimeFigureOut">
               <a:rPr lang="en-US" smtClean="0"/>
-              <a:t>6/25/2021</a:t>
+              <a:t>6/28/2021</a:t>
             </a:fld>
             <a:endParaRPr lang="en-US"/>
           </a:p>
@@ -625,7 +625,7 @@
           <a:p>
             <a:fld id="{5BBE8B7C-962A-488F-9EDA-3E88B9A0CE54}" type="datetimeFigureOut">
               <a:rPr lang="en-US" smtClean="0"/>
-              <a:t>6/25/2021</a:t>
+              <a:t>6/28/2021</a:t>
             </a:fld>
             <a:endParaRPr lang="en-US"/>
           </a:p>
@@ -795,7 +795,7 @@
           <a:p>
             <a:fld id="{5BBE8B7C-962A-488F-9EDA-3E88B9A0CE54}" type="datetimeFigureOut">
               <a:rPr lang="en-US" smtClean="0"/>
-              <a:t>6/25/2021</a:t>
+              <a:t>6/28/2021</a:t>
             </a:fld>
             <a:endParaRPr lang="en-US"/>
           </a:p>
@@ -1041,7 +1041,7 @@
           <a:p>
             <a:fld id="{5BBE8B7C-962A-488F-9EDA-3E88B9A0CE54}" type="datetimeFigureOut">
               <a:rPr lang="en-US" smtClean="0"/>
-              <a:t>6/25/2021</a:t>
+              <a:t>6/28/2021</a:t>
             </a:fld>
             <a:endParaRPr lang="en-US"/>
           </a:p>
@@ -1273,7 +1273,7 @@
           <a:p>
             <a:fld id="{5BBE8B7C-962A-488F-9EDA-3E88B9A0CE54}" type="datetimeFigureOut">
               <a:rPr lang="en-US" smtClean="0"/>
-              <a:t>6/25/2021</a:t>
+              <a:t>6/28/2021</a:t>
             </a:fld>
             <a:endParaRPr lang="en-US"/>
           </a:p>
@@ -1640,7 +1640,7 @@
           <a:p>
             <a:fld id="{5BBE8B7C-962A-488F-9EDA-3E88B9A0CE54}" type="datetimeFigureOut">
               <a:rPr lang="en-US" smtClean="0"/>
-              <a:t>6/25/2021</a:t>
+              <a:t>6/28/2021</a:t>
             </a:fld>
             <a:endParaRPr lang="en-US"/>
           </a:p>
@@ -1758,7 +1758,7 @@
           <a:p>
             <a:fld id="{5BBE8B7C-962A-488F-9EDA-3E88B9A0CE54}" type="datetimeFigureOut">
               <a:rPr lang="en-US" smtClean="0"/>
-              <a:t>6/25/2021</a:t>
+              <a:t>6/28/2021</a:t>
             </a:fld>
             <a:endParaRPr lang="en-US"/>
           </a:p>
@@ -1853,7 +1853,7 @@
           <a:p>
             <a:fld id="{5BBE8B7C-962A-488F-9EDA-3E88B9A0CE54}" type="datetimeFigureOut">
               <a:rPr lang="en-US" smtClean="0"/>
-              <a:t>6/25/2021</a:t>
+              <a:t>6/28/2021</a:t>
             </a:fld>
             <a:endParaRPr lang="en-US"/>
           </a:p>
@@ -2130,7 +2130,7 @@
           <a:p>
             <a:fld id="{5BBE8B7C-962A-488F-9EDA-3E88B9A0CE54}" type="datetimeFigureOut">
               <a:rPr lang="en-US" smtClean="0"/>
-              <a:t>6/25/2021</a:t>
+              <a:t>6/28/2021</a:t>
             </a:fld>
             <a:endParaRPr lang="en-US"/>
           </a:p>
@@ -2383,7 +2383,7 @@
           <a:p>
             <a:fld id="{5BBE8B7C-962A-488F-9EDA-3E88B9A0CE54}" type="datetimeFigureOut">
               <a:rPr lang="en-US" smtClean="0"/>
-              <a:t>6/25/2021</a:t>
+              <a:t>6/28/2021</a:t>
             </a:fld>
             <a:endParaRPr lang="en-US"/>
           </a:p>
@@ -2596,7 +2596,7 @@
           <a:p>
             <a:fld id="{5BBE8B7C-962A-488F-9EDA-3E88B9A0CE54}" type="datetimeFigureOut">
               <a:rPr lang="en-US" smtClean="0"/>
-              <a:t>6/25/2021</a:t>
+              <a:t>6/28/2021</a:t>
             </a:fld>
             <a:endParaRPr lang="en-US"/>
           </a:p>
@@ -3009,8 +3009,8 @@
         </p:nvSpPr>
         <p:spPr>
           <a:xfrm>
-            <a:off x="7373634" y="1862649"/>
-            <a:ext cx="1039319" cy="979865"/>
+            <a:off x="7229790" y="1586191"/>
+            <a:ext cx="1183164" cy="979865"/>
           </a:xfrm>
           <a:prstGeom prst="rect">
             <a:avLst/>
@@ -3055,8 +3055,8 @@
         </p:nvSpPr>
         <p:spPr>
           <a:xfrm>
-            <a:off x="6319019" y="1862649"/>
-            <a:ext cx="1054616" cy="979865"/>
+            <a:off x="6319019" y="1586191"/>
+            <a:ext cx="1037144" cy="979865"/>
           </a:xfrm>
           <a:prstGeom prst="rect">
             <a:avLst/>
@@ -3101,8 +3101,8 @@
         </p:nvSpPr>
         <p:spPr>
           <a:xfrm>
-            <a:off x="5295876" y="1862649"/>
-            <a:ext cx="1039319" cy="979865"/>
+            <a:off x="5295877" y="1586191"/>
+            <a:ext cx="1031488" cy="979865"/>
           </a:xfrm>
           <a:prstGeom prst="rect">
             <a:avLst/>
@@ -3147,8 +3147,8 @@
         </p:nvSpPr>
         <p:spPr>
           <a:xfrm>
-            <a:off x="4241261" y="1862649"/>
-            <a:ext cx="1054616" cy="979865"/>
+            <a:off x="4229100" y="1586191"/>
+            <a:ext cx="1066777" cy="979865"/>
           </a:xfrm>
           <a:prstGeom prst="rect">
             <a:avLst/>
@@ -3193,8 +3193,8 @@
         </p:nvSpPr>
         <p:spPr>
           <a:xfrm>
-            <a:off x="3201941" y="1862651"/>
-            <a:ext cx="1039319" cy="979865"/>
+            <a:off x="3201941" y="1586193"/>
+            <a:ext cx="1027159" cy="979865"/>
           </a:xfrm>
           <a:prstGeom prst="rect">
             <a:avLst/>
@@ -3474,7 +3474,7 @@
         </p:nvGrpSpPr>
         <p:grpSpPr>
           <a:xfrm>
-            <a:off x="3172758" y="1862651"/>
+            <a:off x="3172758" y="1586193"/>
             <a:ext cx="5256372" cy="979865"/>
             <a:chOff x="2135177" y="826851"/>
             <a:chExt cx="5256372" cy="979865"/>
@@ -3559,7 +3559,7 @@
         </p:nvSpPr>
         <p:spPr>
           <a:xfrm>
-            <a:off x="527237" y="2167917"/>
+            <a:off x="527237" y="1891459"/>
             <a:ext cx="1973361" cy="369332"/>
           </a:xfrm>
           <a:prstGeom prst="rect">
@@ -3631,7 +3631,7 @@
         </p:nvGrpSpPr>
         <p:grpSpPr>
           <a:xfrm>
-            <a:off x="7373635" y="182363"/>
+            <a:off x="7351027" y="182363"/>
             <a:ext cx="1055495" cy="979865"/>
             <a:chOff x="4245288" y="813881"/>
             <a:chExt cx="1055495" cy="979865"/>
@@ -3801,7 +3801,7 @@
         </p:nvSpPr>
         <p:spPr>
           <a:xfrm>
-            <a:off x="4310744" y="3020561"/>
+            <a:off x="4310744" y="2744103"/>
             <a:ext cx="2023572" cy="979865"/>
           </a:xfrm>
           <a:prstGeom prst="rect">
@@ -3847,7 +3847,7 @@
         </p:nvSpPr>
         <p:spPr>
           <a:xfrm>
-            <a:off x="3201940" y="3020697"/>
+            <a:off x="3201940" y="2744239"/>
             <a:ext cx="1039319" cy="979865"/>
           </a:xfrm>
           <a:prstGeom prst="rect">
@@ -3893,7 +3893,7 @@
         </p:nvSpPr>
         <p:spPr>
           <a:xfrm>
-            <a:off x="527236" y="3240899"/>
+            <a:off x="527236" y="2964441"/>
             <a:ext cx="1831848" cy="646331"/>
           </a:xfrm>
           <a:prstGeom prst="rect">
@@ -3930,7 +3930,7 @@
         </p:nvSpPr>
         <p:spPr>
           <a:xfrm>
-            <a:off x="6404642" y="3020561"/>
+            <a:off x="6404642" y="2744103"/>
             <a:ext cx="2011955" cy="979865"/>
           </a:xfrm>
           <a:prstGeom prst="rect">
@@ -3976,7 +3976,7 @@
         </p:nvSpPr>
         <p:spPr>
           <a:xfrm>
-            <a:off x="3201940" y="4178473"/>
+            <a:off x="3201940" y="3902015"/>
             <a:ext cx="2096391" cy="979865"/>
           </a:xfrm>
           <a:prstGeom prst="rect">
@@ -4022,7 +4022,7 @@
         </p:nvSpPr>
         <p:spPr>
           <a:xfrm>
-            <a:off x="7368249" y="4183207"/>
+            <a:off x="7368249" y="3902015"/>
             <a:ext cx="1039319" cy="979865"/>
           </a:xfrm>
           <a:prstGeom prst="rect">
@@ -4068,7 +4068,7 @@
         </p:nvSpPr>
         <p:spPr>
           <a:xfrm>
-            <a:off x="527236" y="4398811"/>
+            <a:off x="527236" y="4122353"/>
             <a:ext cx="1831848" cy="646331"/>
           </a:xfrm>
           <a:prstGeom prst="rect">
@@ -4105,7 +4105,7 @@
         </p:nvSpPr>
         <p:spPr>
           <a:xfrm>
-            <a:off x="5353780" y="4178473"/>
+            <a:off x="5353780" y="3902015"/>
             <a:ext cx="2011955" cy="979865"/>
           </a:xfrm>
           <a:prstGeom prst="rect">
@@ -4151,7 +4151,7 @@
         </p:nvSpPr>
         <p:spPr>
           <a:xfrm>
-            <a:off x="4235872" y="3020561"/>
+            <a:off x="4232697" y="2744103"/>
             <a:ext cx="81101" cy="979865"/>
           </a:xfrm>
           <a:prstGeom prst="rect">
@@ -4197,7 +4197,7 @@
         </p:nvSpPr>
         <p:spPr>
           <a:xfrm>
-            <a:off x="6327364" y="3020561"/>
+            <a:off x="6327364" y="2744103"/>
             <a:ext cx="81101" cy="979865"/>
           </a:xfrm>
           <a:prstGeom prst="rect">
@@ -4243,7 +4243,7 @@
         </p:nvSpPr>
         <p:spPr>
           <a:xfrm>
-            <a:off x="7360125" y="4178473"/>
+            <a:off x="7356163" y="3902015"/>
             <a:ext cx="81101" cy="979865"/>
           </a:xfrm>
           <a:prstGeom prst="rect">
@@ -4289,7 +4289,7 @@
         </p:nvSpPr>
         <p:spPr>
           <a:xfrm>
-            <a:off x="5290821" y="4178473"/>
+            <a:off x="5290821" y="3902015"/>
             <a:ext cx="81101" cy="979865"/>
           </a:xfrm>
           <a:prstGeom prst="rect">
@@ -4335,7 +4335,7 @@
         </p:nvGrpSpPr>
         <p:grpSpPr>
           <a:xfrm>
-            <a:off x="3172757" y="3020697"/>
+            <a:off x="3172757" y="2744239"/>
             <a:ext cx="5256372" cy="979865"/>
             <a:chOff x="2135177" y="826851"/>
             <a:chExt cx="5256372" cy="979865"/>
@@ -4412,91 +4412,41 @@
           </p:style>
         </p:cxnSp>
       </p:grpSp>
-      <p:grpSp>
-        <p:nvGrpSpPr>
-          <p:cNvPr id="75" name="Group 74"/>
-          <p:cNvGrpSpPr/>
+      <p:cxnSp>
+        <p:nvCxnSpPr>
+          <p:cNvPr id="77" name="Straight Connector 76"/>
+          <p:cNvCxnSpPr/>
           <p:nvPr/>
-        </p:nvGrpSpPr>
-        <p:grpSpPr>
-          <a:xfrm>
-            <a:off x="3172757" y="4178609"/>
-            <a:ext cx="5256372" cy="979865"/>
-            <a:chOff x="2135177" y="826851"/>
-            <a:chExt cx="5256372" cy="979865"/>
-          </a:xfrm>
-        </p:grpSpPr>
-        <p:cxnSp>
-          <p:nvCxnSpPr>
-            <p:cNvPr id="76" name="Straight Connector 75"/>
-            <p:cNvCxnSpPr/>
-            <p:nvPr/>
-          </p:nvCxnSpPr>
-          <p:spPr>
-            <a:xfrm>
-              <a:off x="2135177" y="1800230"/>
-              <a:ext cx="5256372" cy="6484"/>
-            </a:xfrm>
-            <a:prstGeom prst="line">
-              <a:avLst/>
-            </a:prstGeom>
-            <a:ln w="57150">
-              <a:solidFill>
-                <a:schemeClr val="tx1"/>
-              </a:solidFill>
-            </a:ln>
-          </p:spPr>
-          <p:style>
-            <a:lnRef idx="1">
-              <a:schemeClr val="accent1"/>
-            </a:lnRef>
-            <a:fillRef idx="0">
-              <a:schemeClr val="accent1"/>
-            </a:fillRef>
-            <a:effectRef idx="0">
-              <a:schemeClr val="accent1"/>
-            </a:effectRef>
-            <a:fontRef idx="minor">
+        </p:nvCxnSpPr>
+        <p:spPr>
+          <a:xfrm flipV="1">
+            <a:off x="3201941" y="3902151"/>
+            <a:ext cx="0" cy="979865"/>
+          </a:xfrm>
+          <a:prstGeom prst="line">
+            <a:avLst/>
+          </a:prstGeom>
+          <a:ln w="57150">
+            <a:solidFill>
               <a:schemeClr val="tx1"/>
-            </a:fontRef>
-          </p:style>
-        </p:cxnSp>
-        <p:cxnSp>
-          <p:nvCxnSpPr>
-            <p:cNvPr id="77" name="Straight Connector 76"/>
-            <p:cNvCxnSpPr/>
-            <p:nvPr/>
-          </p:nvCxnSpPr>
-          <p:spPr>
-            <a:xfrm flipV="1">
-              <a:off x="2164361" y="826851"/>
-              <a:ext cx="0" cy="979865"/>
-            </a:xfrm>
-            <a:prstGeom prst="line">
-              <a:avLst/>
-            </a:prstGeom>
-            <a:ln w="57150">
-              <a:solidFill>
-                <a:schemeClr val="tx1"/>
-              </a:solidFill>
-            </a:ln>
-          </p:spPr>
-          <p:style>
-            <a:lnRef idx="1">
-              <a:schemeClr val="accent1"/>
-            </a:lnRef>
-            <a:fillRef idx="0">
-              <a:schemeClr val="accent1"/>
-            </a:fillRef>
-            <a:effectRef idx="0">
-              <a:schemeClr val="accent1"/>
-            </a:effectRef>
-            <a:fontRef idx="minor">
-              <a:schemeClr val="tx1"/>
-            </a:fontRef>
-          </p:style>
-        </p:cxnSp>
-      </p:grpSp>
+            </a:solidFill>
+          </a:ln>
+        </p:spPr>
+        <p:style>
+          <a:lnRef idx="1">
+            <a:schemeClr val="accent1"/>
+          </a:lnRef>
+          <a:fillRef idx="0">
+            <a:schemeClr val="accent1"/>
+          </a:fillRef>
+          <a:effectRef idx="0">
+            <a:schemeClr val="accent1"/>
+          </a:effectRef>
+          <a:fontRef idx="minor">
+            <a:schemeClr val="tx1"/>
+          </a:fontRef>
+        </p:style>
+      </p:cxnSp>
       <p:sp>
         <p:nvSpPr>
           <p:cNvPr id="81" name="Rectangle 80"/>
@@ -4505,8 +4455,8 @@
         </p:nvSpPr>
         <p:spPr>
           <a:xfrm>
-            <a:off x="7373634" y="5339274"/>
-            <a:ext cx="1039319" cy="979865"/>
+            <a:off x="7250806" y="6204149"/>
+            <a:ext cx="1162147" cy="979865"/>
           </a:xfrm>
           <a:prstGeom prst="rect">
             <a:avLst/>
@@ -4551,8 +4501,8 @@
         </p:nvSpPr>
         <p:spPr>
           <a:xfrm>
-            <a:off x="5290821" y="5339274"/>
-            <a:ext cx="2082814" cy="979865"/>
+            <a:off x="5290821" y="6204149"/>
+            <a:ext cx="2062479" cy="979865"/>
           </a:xfrm>
           <a:prstGeom prst="rect">
             <a:avLst/>
@@ -4597,7 +4547,7 @@
         </p:nvSpPr>
         <p:spPr>
           <a:xfrm>
-            <a:off x="3201941" y="5339276"/>
+            <a:off x="3201941" y="6204151"/>
             <a:ext cx="2096390" cy="979865"/>
           </a:xfrm>
           <a:prstGeom prst="rect">
@@ -4643,7 +4593,7 @@
         </p:nvGrpSpPr>
         <p:grpSpPr>
           <a:xfrm>
-            <a:off x="3172758" y="5339276"/>
+            <a:off x="3172758" y="6204151"/>
             <a:ext cx="5256372" cy="979865"/>
             <a:chOff x="2135177" y="826851"/>
             <a:chExt cx="5256372" cy="979865"/>
@@ -4728,7 +4678,7 @@
         </p:nvSpPr>
         <p:spPr>
           <a:xfrm>
-            <a:off x="527237" y="5644542"/>
+            <a:off x="527237" y="6509417"/>
             <a:ext cx="1634935" cy="369332"/>
           </a:xfrm>
           <a:prstGeom prst="rect">
@@ -4758,7 +4708,7 @@
         </p:nvGrpSpPr>
         <p:grpSpPr>
           <a:xfrm>
-            <a:off x="4193934" y="6571541"/>
+            <a:off x="4193934" y="7436416"/>
             <a:ext cx="3189155" cy="394287"/>
             <a:chOff x="3785279" y="5984611"/>
             <a:chExt cx="3189155" cy="394287"/>
@@ -5018,7 +4968,7 @@
         </p:nvSpPr>
         <p:spPr>
           <a:xfrm rot="16200000">
-            <a:off x="7642423" y="3933994"/>
+            <a:off x="7642423" y="3657536"/>
             <a:ext cx="2066656" cy="369332"/>
           </a:xfrm>
           <a:prstGeom prst="rect">
@@ -5040,6 +4990,474 @@
           </a:p>
         </p:txBody>
       </p:sp>
+      <p:sp>
+        <p:nvSpPr>
+          <p:cNvPr id="78" name="Rectangle 77"/>
+          <p:cNvSpPr/>
+          <p:nvPr/>
+        </p:nvSpPr>
+        <p:spPr>
+          <a:xfrm>
+            <a:off x="3204212" y="5058319"/>
+            <a:ext cx="2096391" cy="979865"/>
+          </a:xfrm>
+          <a:prstGeom prst="rect">
+            <a:avLst/>
+          </a:prstGeom>
+          <a:solidFill>
+            <a:srgbClr val="C00000"/>
+          </a:solidFill>
+          <a:ln>
+            <a:noFill/>
+          </a:ln>
+        </p:spPr>
+        <p:style>
+          <a:lnRef idx="2">
+            <a:schemeClr val="accent1">
+              <a:shade val="50000"/>
+            </a:schemeClr>
+          </a:lnRef>
+          <a:fillRef idx="1">
+            <a:schemeClr val="accent1"/>
+          </a:fillRef>
+          <a:effectRef idx="0">
+            <a:schemeClr val="accent1"/>
+          </a:effectRef>
+          <a:fontRef idx="minor">
+            <a:schemeClr val="lt1"/>
+          </a:fontRef>
+        </p:style>
+        <p:txBody>
+          <a:bodyPr rtlCol="0" anchor="ctr"/>
+          <a:lstStyle/>
+          <a:p>
+            <a:pPr algn="ctr"/>
+            <a:endParaRPr lang="en-US"/>
+          </a:p>
+        </p:txBody>
+      </p:sp>
+      <p:sp>
+        <p:nvSpPr>
+          <p:cNvPr id="79" name="Rectangle 78"/>
+          <p:cNvSpPr/>
+          <p:nvPr/>
+        </p:nvSpPr>
+        <p:spPr>
+          <a:xfrm>
+            <a:off x="7370521" y="5058319"/>
+            <a:ext cx="1039319" cy="979865"/>
+          </a:xfrm>
+          <a:prstGeom prst="rect">
+            <a:avLst/>
+          </a:prstGeom>
+          <a:solidFill>
+            <a:srgbClr val="C00000"/>
+          </a:solidFill>
+          <a:ln>
+            <a:noFill/>
+          </a:ln>
+        </p:spPr>
+        <p:style>
+          <a:lnRef idx="2">
+            <a:schemeClr val="accent1">
+              <a:shade val="50000"/>
+            </a:schemeClr>
+          </a:lnRef>
+          <a:fillRef idx="1">
+            <a:schemeClr val="accent1"/>
+          </a:fillRef>
+          <a:effectRef idx="0">
+            <a:schemeClr val="accent1"/>
+          </a:effectRef>
+          <a:fontRef idx="minor">
+            <a:schemeClr val="lt1"/>
+          </a:fontRef>
+        </p:style>
+        <p:txBody>
+          <a:bodyPr rtlCol="0" anchor="ctr"/>
+          <a:lstStyle/>
+          <a:p>
+            <a:pPr algn="ctr"/>
+            <a:endParaRPr lang="en-US"/>
+          </a:p>
+        </p:txBody>
+      </p:sp>
+      <p:sp>
+        <p:nvSpPr>
+          <p:cNvPr id="80" name="TextBox 79"/>
+          <p:cNvSpPr txBox="1"/>
+          <p:nvPr/>
+        </p:nvSpPr>
+        <p:spPr>
+          <a:xfrm>
+            <a:off x="529508" y="5278657"/>
+            <a:ext cx="1831848" cy="646331"/>
+          </a:xfrm>
+          <a:prstGeom prst="rect">
+            <a:avLst/>
+          </a:prstGeom>
+          <a:noFill/>
+        </p:spPr>
+        <p:txBody>
+          <a:bodyPr wrap="none" rtlCol="0">
+            <a:spAutoFit/>
+          </a:bodyPr>
+          <a:lstStyle/>
+          <a:p>
+            <a:r>
+              <a:rPr lang="en-US" b="1" dirty="0" err="1" smtClean="0"/>
+              <a:t>PushEventButton</a:t>
+            </a:r>
+            <a:endParaRPr lang="en-US" b="1" dirty="0" smtClean="0"/>
+          </a:p>
+          <a:p>
+            <a:r>
+              <a:rPr lang="en-US" b="1" dirty="0" smtClean="0"/>
+              <a:t>(capture </a:t>
+            </a:r>
+            <a:r>
+              <a:rPr lang="en-US" b="1" dirty="0" smtClean="0"/>
+              <a:t>both)</a:t>
+            </a:r>
+            <a:endParaRPr lang="en-US" b="1" dirty="0"/>
+          </a:p>
+        </p:txBody>
+      </p:sp>
+      <p:sp>
+        <p:nvSpPr>
+          <p:cNvPr id="88" name="Rectangle 87"/>
+          <p:cNvSpPr/>
+          <p:nvPr/>
+        </p:nvSpPr>
+        <p:spPr>
+          <a:xfrm>
+            <a:off x="5356052" y="5058319"/>
+            <a:ext cx="2011955" cy="979865"/>
+          </a:xfrm>
+          <a:prstGeom prst="rect">
+            <a:avLst/>
+          </a:prstGeom>
+          <a:solidFill>
+            <a:srgbClr val="C00000"/>
+          </a:solidFill>
+          <a:ln>
+            <a:noFill/>
+          </a:ln>
+        </p:spPr>
+        <p:style>
+          <a:lnRef idx="2">
+            <a:schemeClr val="accent1">
+              <a:shade val="50000"/>
+            </a:schemeClr>
+          </a:lnRef>
+          <a:fillRef idx="1">
+            <a:schemeClr val="accent1"/>
+          </a:fillRef>
+          <a:effectRef idx="0">
+            <a:schemeClr val="accent1"/>
+          </a:effectRef>
+          <a:fontRef idx="minor">
+            <a:schemeClr val="lt1"/>
+          </a:fontRef>
+        </p:style>
+        <p:txBody>
+          <a:bodyPr rtlCol="0" anchor="ctr"/>
+          <a:lstStyle/>
+          <a:p>
+            <a:pPr algn="ctr"/>
+            <a:endParaRPr lang="en-US"/>
+          </a:p>
+        </p:txBody>
+      </p:sp>
+      <p:sp>
+        <p:nvSpPr>
+          <p:cNvPr id="90" name="Rectangle 89"/>
+          <p:cNvSpPr/>
+          <p:nvPr/>
+        </p:nvSpPr>
+        <p:spPr>
+          <a:xfrm>
+            <a:off x="7357559" y="5058319"/>
+            <a:ext cx="81101" cy="979865"/>
+          </a:xfrm>
+          <a:prstGeom prst="rect">
+            <a:avLst/>
+          </a:prstGeom>
+          <a:solidFill>
+            <a:srgbClr val="00B050"/>
+          </a:solidFill>
+          <a:ln>
+            <a:noFill/>
+          </a:ln>
+        </p:spPr>
+        <p:style>
+          <a:lnRef idx="2">
+            <a:schemeClr val="accent1">
+              <a:shade val="50000"/>
+            </a:schemeClr>
+          </a:lnRef>
+          <a:fillRef idx="1">
+            <a:schemeClr val="accent1"/>
+          </a:fillRef>
+          <a:effectRef idx="0">
+            <a:schemeClr val="accent1"/>
+          </a:effectRef>
+          <a:fontRef idx="minor">
+            <a:schemeClr val="lt1"/>
+          </a:fontRef>
+        </p:style>
+        <p:txBody>
+          <a:bodyPr rtlCol="0" anchor="ctr"/>
+          <a:lstStyle/>
+          <a:p>
+            <a:pPr algn="ctr"/>
+            <a:endParaRPr lang="en-US"/>
+          </a:p>
+        </p:txBody>
+      </p:sp>
+      <p:sp>
+        <p:nvSpPr>
+          <p:cNvPr id="94" name="Rectangle 93"/>
+          <p:cNvSpPr/>
+          <p:nvPr/>
+        </p:nvSpPr>
+        <p:spPr>
+          <a:xfrm>
+            <a:off x="5293093" y="5058319"/>
+            <a:ext cx="81101" cy="979865"/>
+          </a:xfrm>
+          <a:prstGeom prst="rect">
+            <a:avLst/>
+          </a:prstGeom>
+          <a:solidFill>
+            <a:srgbClr val="00B050"/>
+          </a:solidFill>
+          <a:ln>
+            <a:noFill/>
+          </a:ln>
+        </p:spPr>
+        <p:style>
+          <a:lnRef idx="2">
+            <a:schemeClr val="accent1">
+              <a:shade val="50000"/>
+            </a:schemeClr>
+          </a:lnRef>
+          <a:fillRef idx="1">
+            <a:schemeClr val="accent1"/>
+          </a:fillRef>
+          <a:effectRef idx="0">
+            <a:schemeClr val="accent1"/>
+          </a:effectRef>
+          <a:fontRef idx="minor">
+            <a:schemeClr val="lt1"/>
+          </a:fontRef>
+        </p:style>
+        <p:txBody>
+          <a:bodyPr rtlCol="0" anchor="ctr"/>
+          <a:lstStyle/>
+          <a:p>
+            <a:pPr algn="ctr"/>
+            <a:endParaRPr lang="en-US"/>
+          </a:p>
+        </p:txBody>
+      </p:sp>
+      <p:cxnSp>
+        <p:nvCxnSpPr>
+          <p:cNvPr id="101" name="Straight Connector 100"/>
+          <p:cNvCxnSpPr/>
+          <p:nvPr/>
+        </p:nvCxnSpPr>
+        <p:spPr>
+          <a:xfrm flipV="1">
+            <a:off x="3204213" y="5058455"/>
+            <a:ext cx="0" cy="979865"/>
+          </a:xfrm>
+          <a:prstGeom prst="line">
+            <a:avLst/>
+          </a:prstGeom>
+          <a:ln w="57150">
+            <a:solidFill>
+              <a:schemeClr val="tx1"/>
+            </a:solidFill>
+          </a:ln>
+        </p:spPr>
+        <p:style>
+          <a:lnRef idx="1">
+            <a:schemeClr val="accent1"/>
+          </a:lnRef>
+          <a:fillRef idx="0">
+            <a:schemeClr val="accent1"/>
+          </a:fillRef>
+          <a:effectRef idx="0">
+            <a:schemeClr val="accent1"/>
+          </a:effectRef>
+          <a:fontRef idx="minor">
+            <a:schemeClr val="tx1"/>
+          </a:fontRef>
+        </p:style>
+      </p:cxnSp>
+      <p:sp>
+        <p:nvSpPr>
+          <p:cNvPr id="102" name="Rectangle 101"/>
+          <p:cNvSpPr/>
+          <p:nvPr/>
+        </p:nvSpPr>
+        <p:spPr>
+          <a:xfrm>
+            <a:off x="4232480" y="5058319"/>
+            <a:ext cx="81101" cy="979865"/>
+          </a:xfrm>
+          <a:prstGeom prst="rect">
+            <a:avLst/>
+          </a:prstGeom>
+          <a:solidFill>
+            <a:srgbClr val="00B050"/>
+          </a:solidFill>
+          <a:ln>
+            <a:noFill/>
+          </a:ln>
+        </p:spPr>
+        <p:style>
+          <a:lnRef idx="2">
+            <a:schemeClr val="accent1">
+              <a:shade val="50000"/>
+            </a:schemeClr>
+          </a:lnRef>
+          <a:fillRef idx="1">
+            <a:schemeClr val="accent1"/>
+          </a:fillRef>
+          <a:effectRef idx="0">
+            <a:schemeClr val="accent1"/>
+          </a:effectRef>
+          <a:fontRef idx="minor">
+            <a:schemeClr val="lt1"/>
+          </a:fontRef>
+        </p:style>
+        <p:txBody>
+          <a:bodyPr rtlCol="0" anchor="ctr"/>
+          <a:lstStyle/>
+          <a:p>
+            <a:pPr algn="ctr"/>
+            <a:endParaRPr lang="en-US"/>
+          </a:p>
+        </p:txBody>
+      </p:sp>
+      <p:sp>
+        <p:nvSpPr>
+          <p:cNvPr id="103" name="Rectangle 102"/>
+          <p:cNvSpPr/>
+          <p:nvPr/>
+        </p:nvSpPr>
+        <p:spPr>
+          <a:xfrm>
+            <a:off x="6323541" y="5058319"/>
+            <a:ext cx="81101" cy="979865"/>
+          </a:xfrm>
+          <a:prstGeom prst="rect">
+            <a:avLst/>
+          </a:prstGeom>
+          <a:solidFill>
+            <a:srgbClr val="00B050"/>
+          </a:solidFill>
+          <a:ln>
+            <a:noFill/>
+          </a:ln>
+        </p:spPr>
+        <p:style>
+          <a:lnRef idx="2">
+            <a:schemeClr val="accent1">
+              <a:shade val="50000"/>
+            </a:schemeClr>
+          </a:lnRef>
+          <a:fillRef idx="1">
+            <a:schemeClr val="accent1"/>
+          </a:fillRef>
+          <a:effectRef idx="0">
+            <a:schemeClr val="accent1"/>
+          </a:effectRef>
+          <a:fontRef idx="minor">
+            <a:schemeClr val="lt1"/>
+          </a:fontRef>
+        </p:style>
+        <p:txBody>
+          <a:bodyPr rtlCol="0" anchor="ctr"/>
+          <a:lstStyle/>
+          <a:p>
+            <a:pPr algn="ctr"/>
+            <a:endParaRPr lang="en-US"/>
+          </a:p>
+        </p:txBody>
+      </p:sp>
+      <p:cxnSp>
+        <p:nvCxnSpPr>
+          <p:cNvPr id="76" name="Straight Connector 75"/>
+          <p:cNvCxnSpPr/>
+          <p:nvPr/>
+        </p:nvCxnSpPr>
+        <p:spPr>
+          <a:xfrm>
+            <a:off x="3172757" y="4875530"/>
+            <a:ext cx="5256372" cy="6484"/>
+          </a:xfrm>
+          <a:prstGeom prst="line">
+            <a:avLst/>
+          </a:prstGeom>
+          <a:ln w="57150">
+            <a:solidFill>
+              <a:schemeClr val="tx1"/>
+            </a:solidFill>
+          </a:ln>
+        </p:spPr>
+        <p:style>
+          <a:lnRef idx="1">
+            <a:schemeClr val="accent1"/>
+          </a:lnRef>
+          <a:fillRef idx="0">
+            <a:schemeClr val="accent1"/>
+          </a:fillRef>
+          <a:effectRef idx="0">
+            <a:schemeClr val="accent1"/>
+          </a:effectRef>
+          <a:fontRef idx="minor">
+            <a:schemeClr val="tx1"/>
+          </a:fontRef>
+        </p:style>
+      </p:cxnSp>
+      <p:cxnSp>
+        <p:nvCxnSpPr>
+          <p:cNvPr id="100" name="Straight Connector 99"/>
+          <p:cNvCxnSpPr/>
+          <p:nvPr/>
+        </p:nvCxnSpPr>
+        <p:spPr>
+          <a:xfrm>
+            <a:off x="3175029" y="6031834"/>
+            <a:ext cx="5256372" cy="6484"/>
+          </a:xfrm>
+          <a:prstGeom prst="line">
+            <a:avLst/>
+          </a:prstGeom>
+          <a:ln w="57150">
+            <a:solidFill>
+              <a:schemeClr val="tx1"/>
+            </a:solidFill>
+          </a:ln>
+        </p:spPr>
+        <p:style>
+          <a:lnRef idx="1">
+            <a:schemeClr val="accent1"/>
+          </a:lnRef>
+          <a:fillRef idx="0">
+            <a:schemeClr val="accent1"/>
+          </a:fillRef>
+          <a:effectRef idx="0">
+            <a:schemeClr val="accent1"/>
+          </a:effectRef>
+          <a:fontRef idx="minor">
+            <a:schemeClr val="tx1"/>
+          </a:fontRef>
+        </p:style>
+      </p:cxnSp>
     </p:spTree>
     <p:extLst>
       <p:ext uri="{BB962C8B-B14F-4D97-AF65-F5344CB8AC3E}">
@@ -7235,11 +7653,11 @@
   <p:clrMapOvr>
     <a:masterClrMapping/>
   </p:clrMapOvr>
-  <mc:AlternateContent xmlns:mc="http://schemas.openxmlformats.org/markup-compatibility/2006">
-    <mc:Choice xmlns:p14="http://schemas.microsoft.com/office/powerpoint/2010/main" Requires="p14">
+  <mc:AlternateContent xmlns:mc="http://schemas.openxmlformats.org/markup-compatibility/2006" xmlns:p14="http://schemas.microsoft.com/office/powerpoint/2010/main">
+    <mc:Choice Requires="p14">
       <p:transition spd="slow" p14:dur="2000"/>
     </mc:Choice>
-    <mc:Fallback>
+    <mc:Fallback xmlns="">
       <p:transition spd="slow"/>
     </mc:Fallback>
   </mc:AlternateContent>

</xml_diff>